<commit_message>
change directory structure to make rep public
Shifted current assignments to new directory, not in repository, so that
we can make this public.
</commit_message>
<xml_diff>
--- a/Logistics/UG_quantsalespitch_2014.pptx
+++ b/Logistics/UG_quantsalespitch_2014.pptx
@@ -16,7 +16,7 @@
     <p:sldId id="421" r:id="rId4"/>
   </p:sldIdLst>
   <p:sldSz cx="9144000" cy="6858000" type="screen4x3"/>
-  <p:notesSz cx="7099300" cy="10234613"/>
+  <p:notesSz cx="6881813" cy="9296400"/>
   <p:defaultTextStyle>
     <a:defPPr>
       <a:defRPr lang="en-US"/>
@@ -198,8 +198,8 @@
         </p:nvSpPr>
         <p:spPr bwMode="auto">
           <a:xfrm>
-            <a:off x="0" y="0"/>
-            <a:ext cx="3076363" cy="511731"/>
+            <a:off x="0" y="1"/>
+            <a:ext cx="2982119" cy="464820"/>
           </a:xfrm>
           <a:prstGeom prst="rect">
             <a:avLst/>
@@ -214,14 +214,14 @@
           <a:effectLst/>
         </p:spPr>
         <p:txBody>
-          <a:bodyPr vert="horz" wrap="square" lIns="99048" tIns="49524" rIns="99048" bIns="49524" numCol="1" anchor="t" anchorCtr="0" compatLnSpc="1">
+          <a:bodyPr vert="horz" wrap="square" lIns="92441" tIns="46221" rIns="92441" bIns="46221" numCol="1" anchor="t" anchorCtr="0" compatLnSpc="1">
             <a:prstTxWarp prst="textNoShape">
               <a:avLst/>
             </a:prstTxWarp>
           </a:bodyPr>
           <a:lstStyle>
             <a:lvl1pPr>
-              <a:defRPr sz="1300">
+              <a:defRPr sz="1200">
                 <a:latin typeface="Arial" pitchFamily="-108" charset="0"/>
                 <a:ea typeface="Arial" pitchFamily="-108" charset="0"/>
                 <a:cs typeface="Arial" pitchFamily="-108" charset="0"/>
@@ -248,8 +248,8 @@
         </p:nvSpPr>
         <p:spPr bwMode="auto">
           <a:xfrm>
-            <a:off x="4021294" y="0"/>
-            <a:ext cx="3076363" cy="511731"/>
+            <a:off x="3898102" y="1"/>
+            <a:ext cx="2982119" cy="464820"/>
           </a:xfrm>
           <a:prstGeom prst="rect">
             <a:avLst/>
@@ -264,14 +264,14 @@
           <a:effectLst/>
         </p:spPr>
         <p:txBody>
-          <a:bodyPr vert="horz" wrap="square" lIns="99048" tIns="49524" rIns="99048" bIns="49524" numCol="1" anchor="t" anchorCtr="0" compatLnSpc="1">
+          <a:bodyPr vert="horz" wrap="square" lIns="92441" tIns="46221" rIns="92441" bIns="46221" numCol="1" anchor="t" anchorCtr="0" compatLnSpc="1">
             <a:prstTxWarp prst="textNoShape">
               <a:avLst/>
             </a:prstTxWarp>
           </a:bodyPr>
           <a:lstStyle>
             <a:lvl1pPr algn="r">
-              <a:defRPr sz="1300">
+              <a:defRPr sz="1200">
                 <a:latin typeface="Arial" pitchFamily="-108" charset="0"/>
                 <a:ea typeface="Arial" pitchFamily="-108" charset="0"/>
                 <a:cs typeface="Arial" pitchFamily="-108" charset="0"/>
@@ -298,8 +298,8 @@
         </p:nvSpPr>
         <p:spPr bwMode="auto">
           <a:xfrm>
-            <a:off x="0" y="9721106"/>
-            <a:ext cx="3076363" cy="511731"/>
+            <a:off x="0" y="8829967"/>
+            <a:ext cx="2982119" cy="464820"/>
           </a:xfrm>
           <a:prstGeom prst="rect">
             <a:avLst/>
@@ -314,14 +314,14 @@
           <a:effectLst/>
         </p:spPr>
         <p:txBody>
-          <a:bodyPr vert="horz" wrap="square" lIns="99048" tIns="49524" rIns="99048" bIns="49524" numCol="1" anchor="b" anchorCtr="0" compatLnSpc="1">
+          <a:bodyPr vert="horz" wrap="square" lIns="92441" tIns="46221" rIns="92441" bIns="46221" numCol="1" anchor="b" anchorCtr="0" compatLnSpc="1">
             <a:prstTxWarp prst="textNoShape">
               <a:avLst/>
             </a:prstTxWarp>
           </a:bodyPr>
           <a:lstStyle>
             <a:lvl1pPr>
-              <a:defRPr sz="1300">
+              <a:defRPr sz="1200">
                 <a:latin typeface="Arial" pitchFamily="-108" charset="0"/>
                 <a:ea typeface="Arial" pitchFamily="-108" charset="0"/>
                 <a:cs typeface="Arial" pitchFamily="-108" charset="0"/>
@@ -348,8 +348,8 @@
         </p:nvSpPr>
         <p:spPr bwMode="auto">
           <a:xfrm>
-            <a:off x="4021294" y="9721106"/>
-            <a:ext cx="3076363" cy="511731"/>
+            <a:off x="3898102" y="8829967"/>
+            <a:ext cx="2982119" cy="464820"/>
           </a:xfrm>
           <a:prstGeom prst="rect">
             <a:avLst/>
@@ -364,14 +364,14 @@
           <a:effectLst/>
         </p:spPr>
         <p:txBody>
-          <a:bodyPr vert="horz" wrap="square" lIns="99048" tIns="49524" rIns="99048" bIns="49524" numCol="1" anchor="b" anchorCtr="0" compatLnSpc="1">
+          <a:bodyPr vert="horz" wrap="square" lIns="92441" tIns="46221" rIns="92441" bIns="46221" numCol="1" anchor="b" anchorCtr="0" compatLnSpc="1">
             <a:prstTxWarp prst="textNoShape">
               <a:avLst/>
             </a:prstTxWarp>
           </a:bodyPr>
           <a:lstStyle>
             <a:lvl1pPr algn="r">
-              <a:defRPr sz="1300" smtClean="0"/>
+              <a:defRPr sz="1200" smtClean="0"/>
             </a:lvl1pPr>
           </a:lstStyle>
           <a:p>
@@ -438,8 +438,8 @@
         </p:nvSpPr>
         <p:spPr bwMode="auto">
           <a:xfrm>
-            <a:off x="0" y="0"/>
-            <a:ext cx="3076363" cy="511731"/>
+            <a:off x="0" y="1"/>
+            <a:ext cx="2982119" cy="464820"/>
           </a:xfrm>
           <a:prstGeom prst="rect">
             <a:avLst/>
@@ -454,14 +454,14 @@
           <a:effectLst/>
         </p:spPr>
         <p:txBody>
-          <a:bodyPr vert="horz" wrap="square" lIns="99048" tIns="49524" rIns="99048" bIns="49524" numCol="1" anchor="t" anchorCtr="0" compatLnSpc="1">
+          <a:bodyPr vert="horz" wrap="square" lIns="92441" tIns="46221" rIns="92441" bIns="46221" numCol="1" anchor="t" anchorCtr="0" compatLnSpc="1">
             <a:prstTxWarp prst="textNoShape">
               <a:avLst/>
             </a:prstTxWarp>
           </a:bodyPr>
           <a:lstStyle>
             <a:lvl1pPr>
-              <a:defRPr sz="1300">
+              <a:defRPr sz="1200">
                 <a:latin typeface="Arial" pitchFamily="-108" charset="0"/>
                 <a:ea typeface="Arial" pitchFamily="-108" charset="0"/>
                 <a:cs typeface="Arial" pitchFamily="-108" charset="0"/>
@@ -488,8 +488,8 @@
         </p:nvSpPr>
         <p:spPr bwMode="auto">
           <a:xfrm>
-            <a:off x="4021294" y="0"/>
-            <a:ext cx="3076363" cy="511731"/>
+            <a:off x="3898102" y="1"/>
+            <a:ext cx="2982119" cy="464820"/>
           </a:xfrm>
           <a:prstGeom prst="rect">
             <a:avLst/>
@@ -504,14 +504,14 @@
           <a:effectLst/>
         </p:spPr>
         <p:txBody>
-          <a:bodyPr vert="horz" wrap="square" lIns="99048" tIns="49524" rIns="99048" bIns="49524" numCol="1" anchor="t" anchorCtr="0" compatLnSpc="1">
+          <a:bodyPr vert="horz" wrap="square" lIns="92441" tIns="46221" rIns="92441" bIns="46221" numCol="1" anchor="t" anchorCtr="0" compatLnSpc="1">
             <a:prstTxWarp prst="textNoShape">
               <a:avLst/>
             </a:prstTxWarp>
           </a:bodyPr>
           <a:lstStyle>
             <a:lvl1pPr algn="r">
-              <a:defRPr sz="1300">
+              <a:defRPr sz="1200">
                 <a:latin typeface="Arial" pitchFamily="-108" charset="0"/>
                 <a:ea typeface="Arial" pitchFamily="-108" charset="0"/>
                 <a:cs typeface="Arial" pitchFamily="-108" charset="0"/>
@@ -538,8 +538,8 @@
         </p:nvSpPr>
         <p:spPr bwMode="auto">
           <a:xfrm>
-            <a:off x="992188" y="768350"/>
-            <a:ext cx="5114925" cy="3836988"/>
+            <a:off x="1117600" y="698500"/>
+            <a:ext cx="4646613" cy="3484563"/>
           </a:xfrm>
           <a:prstGeom prst="rect">
             <a:avLst/>
@@ -567,8 +567,8 @@
         </p:nvSpPr>
         <p:spPr bwMode="auto">
           <a:xfrm>
-            <a:off x="709930" y="4861441"/>
-            <a:ext cx="5679440" cy="4605576"/>
+            <a:off x="688182" y="4415790"/>
+            <a:ext cx="5505450" cy="4183380"/>
           </a:xfrm>
           <a:prstGeom prst="rect">
             <a:avLst/>
@@ -583,7 +583,7 @@
           <a:effectLst/>
         </p:spPr>
         <p:txBody>
-          <a:bodyPr vert="horz" wrap="square" lIns="99048" tIns="49524" rIns="99048" bIns="49524" numCol="1" anchor="t" anchorCtr="0" compatLnSpc="1">
+          <a:bodyPr vert="horz" wrap="square" lIns="92441" tIns="46221" rIns="92441" bIns="46221" numCol="1" anchor="t" anchorCtr="0" compatLnSpc="1">
             <a:prstTxWarp prst="textNoShape">
               <a:avLst/>
             </a:prstTxWarp>
@@ -638,8 +638,8 @@
         </p:nvSpPr>
         <p:spPr bwMode="auto">
           <a:xfrm>
-            <a:off x="0" y="9721106"/>
-            <a:ext cx="3076363" cy="511731"/>
+            <a:off x="0" y="8829967"/>
+            <a:ext cx="2982119" cy="464820"/>
           </a:xfrm>
           <a:prstGeom prst="rect">
             <a:avLst/>
@@ -654,14 +654,14 @@
           <a:effectLst/>
         </p:spPr>
         <p:txBody>
-          <a:bodyPr vert="horz" wrap="square" lIns="99048" tIns="49524" rIns="99048" bIns="49524" numCol="1" anchor="b" anchorCtr="0" compatLnSpc="1">
+          <a:bodyPr vert="horz" wrap="square" lIns="92441" tIns="46221" rIns="92441" bIns="46221" numCol="1" anchor="b" anchorCtr="0" compatLnSpc="1">
             <a:prstTxWarp prst="textNoShape">
               <a:avLst/>
             </a:prstTxWarp>
           </a:bodyPr>
           <a:lstStyle>
             <a:lvl1pPr>
-              <a:defRPr sz="1300">
+              <a:defRPr sz="1200">
                 <a:latin typeface="Arial" pitchFamily="-108" charset="0"/>
                 <a:ea typeface="Arial" pitchFamily="-108" charset="0"/>
                 <a:cs typeface="Arial" pitchFamily="-108" charset="0"/>
@@ -688,8 +688,8 @@
         </p:nvSpPr>
         <p:spPr bwMode="auto">
           <a:xfrm>
-            <a:off x="4021294" y="9721106"/>
-            <a:ext cx="3076363" cy="511731"/>
+            <a:off x="3898102" y="8829967"/>
+            <a:ext cx="2982119" cy="464820"/>
           </a:xfrm>
           <a:prstGeom prst="rect">
             <a:avLst/>
@@ -704,14 +704,14 @@
           <a:effectLst/>
         </p:spPr>
         <p:txBody>
-          <a:bodyPr vert="horz" wrap="square" lIns="99048" tIns="49524" rIns="99048" bIns="49524" numCol="1" anchor="b" anchorCtr="0" compatLnSpc="1">
+          <a:bodyPr vert="horz" wrap="square" lIns="92441" tIns="46221" rIns="92441" bIns="46221" numCol="1" anchor="b" anchorCtr="0" compatLnSpc="1">
             <a:prstTxWarp prst="textNoShape">
               <a:avLst/>
             </a:prstTxWarp>
           </a:bodyPr>
           <a:lstStyle>
             <a:lvl1pPr algn="r">
-              <a:defRPr sz="1300" smtClean="0"/>
+              <a:defRPr sz="1200" smtClean="0"/>
             </a:lvl1pPr>
           </a:lstStyle>
           <a:p>
@@ -939,6 +939,166 @@
           <a:lstStyle/>
           <a:p>
             <a:pPr eaLnBrk="1" hangingPunct="1"/>
+            <a:r>
+              <a:rPr lang="en-US" dirty="0" smtClean="0">
+                <a:latin typeface="Arial" charset="0"/>
+                <a:cs typeface="Arial" charset="0"/>
+              </a:rPr>
+              <a:t>Welcome to NYU, and welcome</a:t>
+            </a:r>
+            <a:r>
+              <a:rPr lang="en-US" baseline="0" dirty="0" smtClean="0">
+                <a:latin typeface="Arial" charset="0"/>
+                <a:cs typeface="Arial" charset="0"/>
+              </a:rPr>
+              <a:t> to Stern.  </a:t>
+            </a:r>
+          </a:p>
+          <a:p>
+            <a:pPr eaLnBrk="1" hangingPunct="1"/>
+            <a:endParaRPr lang="en-US" baseline="0" dirty="0" smtClean="0">
+              <a:latin typeface="Arial" charset="0"/>
+              <a:cs typeface="Arial" charset="0"/>
+            </a:endParaRPr>
+          </a:p>
+          <a:p>
+            <a:pPr eaLnBrk="1" hangingPunct="1"/>
+            <a:r>
+              <a:rPr lang="en-US" baseline="0" dirty="0" smtClean="0">
+                <a:latin typeface="Arial" charset="0"/>
+                <a:cs typeface="Arial" charset="0"/>
+              </a:rPr>
+              <a:t>I’d like to tell you a story.  </a:t>
+            </a:r>
+            <a:r>
+              <a:rPr lang="en-US" baseline="0" dirty="0" smtClean="0">
+                <a:latin typeface="Arial" charset="0"/>
+                <a:cs typeface="Arial" charset="0"/>
+              </a:rPr>
+              <a:t>This has </a:t>
+            </a:r>
+            <a:r>
+              <a:rPr lang="en-US" baseline="0" dirty="0" smtClean="0">
+                <a:latin typeface="Arial" charset="0"/>
+                <a:cs typeface="Arial" charset="0"/>
+              </a:rPr>
+              <a:t>happened several </a:t>
+            </a:r>
+            <a:r>
+              <a:rPr lang="en-US" baseline="0" dirty="0" smtClean="0">
+                <a:latin typeface="Arial" charset="0"/>
+                <a:cs typeface="Arial" charset="0"/>
+              </a:rPr>
+              <a:t>times, </a:t>
+            </a:r>
+            <a:r>
+              <a:rPr lang="en-US" baseline="0" dirty="0" smtClean="0">
+                <a:latin typeface="Arial" charset="0"/>
+                <a:cs typeface="Arial" charset="0"/>
+              </a:rPr>
+              <a:t>so it’s really a composite.  I teach a course in mathematical finance that uses more math than the usual course at Stern.  But the thing about the asset pricing side of finance is that it’s really simpler if you make it more mathematical.  </a:t>
+            </a:r>
+            <a:r>
+              <a:rPr lang="en-US" baseline="0" dirty="0" smtClean="0">
+                <a:latin typeface="Arial" charset="0"/>
+                <a:cs typeface="Arial" charset="0"/>
+              </a:rPr>
+              <a:t>I know that </a:t>
+            </a:r>
+            <a:r>
+              <a:rPr lang="en-US" baseline="0" dirty="0" smtClean="0">
+                <a:latin typeface="Arial" charset="0"/>
+                <a:cs typeface="Arial" charset="0"/>
+              </a:rPr>
+              <a:t>sounds strange, but it’s true.  </a:t>
+            </a:r>
+            <a:r>
+              <a:rPr lang="en-US" baseline="0" dirty="0" smtClean="0">
+                <a:latin typeface="Arial" charset="0"/>
+                <a:cs typeface="Arial" charset="0"/>
+              </a:rPr>
+              <a:t>One </a:t>
+            </a:r>
+            <a:r>
+              <a:rPr lang="en-US" baseline="0" dirty="0" smtClean="0">
+                <a:latin typeface="Arial" charset="0"/>
+                <a:cs typeface="Arial" charset="0"/>
+              </a:rPr>
+              <a:t>of the students in the course – let’s call her Anna – had </a:t>
+            </a:r>
+            <a:r>
+              <a:rPr lang="en-US" baseline="0" dirty="0" smtClean="0">
+                <a:latin typeface="Arial" charset="0"/>
+                <a:cs typeface="Arial" charset="0"/>
+              </a:rPr>
+              <a:t>done what a lot of </a:t>
+            </a:r>
+            <a:r>
+              <a:rPr lang="en-US" baseline="0" smtClean="0">
+                <a:latin typeface="Arial" charset="0"/>
+                <a:cs typeface="Arial" charset="0"/>
+              </a:rPr>
+              <a:t>Stern students </a:t>
+            </a:r>
+            <a:r>
+              <a:rPr lang="en-US" baseline="0" dirty="0" smtClean="0">
+                <a:latin typeface="Arial" charset="0"/>
+                <a:cs typeface="Arial" charset="0"/>
+              </a:rPr>
+              <a:t>do, take </a:t>
+            </a:r>
+            <a:r>
+              <a:rPr lang="en-US" baseline="0" dirty="0" smtClean="0">
+                <a:latin typeface="Arial" charset="0"/>
+                <a:cs typeface="Arial" charset="0"/>
+              </a:rPr>
+              <a:t>one semester of calculus and </a:t>
+            </a:r>
+            <a:r>
+              <a:rPr lang="en-US" baseline="0" dirty="0" smtClean="0">
+                <a:latin typeface="Arial" charset="0"/>
+                <a:cs typeface="Arial" charset="0"/>
+              </a:rPr>
+              <a:t>stop.  So </a:t>
+            </a:r>
+            <a:r>
+              <a:rPr lang="en-US" baseline="0" dirty="0" smtClean="0">
+                <a:latin typeface="Arial" charset="0"/>
+                <a:cs typeface="Arial" charset="0"/>
+              </a:rPr>
+              <a:t>the course was pretty challenging for her.  About halfway through the term, she comes to see me and says:  you know, I wish I’d taken more courses like this, it’s really interesting.  But I’m graduating next month.  </a:t>
+            </a:r>
+            <a:r>
+              <a:rPr lang="en-US" baseline="0" dirty="0" smtClean="0">
+                <a:latin typeface="Arial" charset="0"/>
+                <a:cs typeface="Arial" charset="0"/>
+              </a:rPr>
+              <a:t>I wish someone </a:t>
+            </a:r>
+            <a:r>
+              <a:rPr lang="en-US" baseline="0" dirty="0" smtClean="0">
+                <a:latin typeface="Arial" charset="0"/>
+                <a:cs typeface="Arial" charset="0"/>
+              </a:rPr>
+              <a:t>had told me about this earlier.  </a:t>
+            </a:r>
+          </a:p>
+          <a:p>
+            <a:pPr eaLnBrk="1" hangingPunct="1"/>
+            <a:endParaRPr lang="en-US" baseline="0" dirty="0" smtClean="0">
+              <a:latin typeface="Arial" charset="0"/>
+              <a:cs typeface="Arial" charset="0"/>
+            </a:endParaRPr>
+          </a:p>
+          <a:p>
+            <a:pPr eaLnBrk="1" hangingPunct="1"/>
+            <a:r>
+              <a:rPr lang="en-US" baseline="0" dirty="0" smtClean="0">
+                <a:latin typeface="Arial" charset="0"/>
+                <a:cs typeface="Arial" charset="0"/>
+              </a:rPr>
+              <a:t>So that’s why I’m here:  to remind you to think about getting some quant skills.  Not only quant skills, but put them on your list.  </a:t>
+            </a:r>
             <a:endParaRPr lang="en-US" dirty="0" smtClean="0">
               <a:latin typeface="Arial" charset="0"/>
               <a:cs typeface="Arial" charset="0"/>
@@ -4320,15 +4480,7 @@
             </a:br>
             <a:r>
               <a:rPr lang="en-US" dirty="0" smtClean="0"/>
-              <a:t>Dave Backus &amp; </a:t>
-            </a:r>
-            <a:r>
-              <a:rPr lang="en-US" dirty="0" smtClean="0"/>
-              <a:t>Joel </a:t>
-            </a:r>
-            <a:r>
-              <a:rPr lang="en-US" dirty="0" err="1" smtClean="0"/>
-              <a:t>Steckel</a:t>
+              <a:t>Dave Backus</a:t>
             </a:r>
             <a:endParaRPr lang="en-US" i="1" dirty="0" smtClean="0"/>
           </a:p>
@@ -4440,7 +4592,7 @@
         </p:nvSpPr>
         <p:spPr>
           <a:xfrm>
-            <a:off x="457200" y="1631617"/>
+            <a:off x="457200" y="1608467"/>
             <a:ext cx="8229600" cy="3740465"/>
           </a:xfrm>
         </p:spPr>
@@ -4453,12 +4605,12 @@
                 <a:spcPts val="1200"/>
               </a:spcBef>
               <a:spcAft>
-                <a:spcPts val="0"/>
+                <a:spcPts val="600"/>
               </a:spcAft>
             </a:pPr>
             <a:r>
-              <a:rPr lang="en-US" sz="2400" dirty="0" smtClean="0"/>
-              <a:t>What? </a:t>
+              <a:rPr lang="en-US" sz="2400" dirty="0"/>
+              <a:t>Why?</a:t>
             </a:r>
           </a:p>
           <a:p>
@@ -4472,29 +4624,8 @@
             </a:pPr>
             <a:r>
               <a:rPr lang="en-US" sz="2000" dirty="0"/>
-              <a:t>Learn to code:  </a:t>
-            </a:r>
-            <a:r>
-              <a:rPr lang="en-US" sz="2000" b="1" dirty="0"/>
-              <a:t>Python</a:t>
-            </a:r>
-            <a:r>
-              <a:rPr lang="en-US" sz="2000" dirty="0"/>
-              <a:t>, </a:t>
-            </a:r>
-            <a:r>
-              <a:rPr lang="en-US" sz="2000" dirty="0" err="1"/>
-              <a:t>Matlab</a:t>
-            </a:r>
-            <a:r>
-              <a:rPr lang="en-US" sz="2000" dirty="0"/>
-              <a:t>, R, </a:t>
-            </a:r>
-            <a:r>
-              <a:rPr lang="en-US" sz="2000" dirty="0" smtClean="0"/>
-              <a:t>C++, …    </a:t>
-            </a:r>
-            <a:endParaRPr lang="en-US" sz="2000" dirty="0"/>
+              <a:t>View the world in a new way </a:t>
+            </a:r>
           </a:p>
           <a:p>
             <a:pPr lvl="1" eaLnBrk="1" hangingPunct="1">
@@ -4507,41 +4638,9 @@
             </a:pPr>
             <a:r>
               <a:rPr lang="en-US" sz="2000" dirty="0"/>
-              <a:t>Join the math gym:  </a:t>
-            </a:r>
-            <a:r>
-              <a:rPr lang="en-US" sz="2000" b="1" dirty="0"/>
-              <a:t>calculus</a:t>
-            </a:r>
-            <a:r>
-              <a:rPr lang="en-US" sz="2000" dirty="0"/>
-              <a:t>, </a:t>
-            </a:r>
-            <a:r>
-              <a:rPr lang="en-US" sz="2000" b="1" dirty="0"/>
-              <a:t>linear algebra</a:t>
-            </a:r>
-            <a:r>
-              <a:rPr lang="en-US" sz="2000" dirty="0"/>
-              <a:t>, </a:t>
-            </a:r>
-            <a:r>
-              <a:rPr lang="en-US" sz="2000" dirty="0" smtClean="0"/>
-              <a:t>… 		</a:t>
-            </a:r>
-            <a:r>
-              <a:rPr lang="en-US" sz="2000" smtClean="0"/>
-              <a:t>  [</a:t>
-            </a:r>
-            <a:r>
-              <a:rPr lang="en-US" sz="2000" dirty="0" smtClean="0"/>
-              <a:t>short </a:t>
-            </a:r>
-            <a:r>
-              <a:rPr lang="en-US" sz="2000" smtClean="0"/>
-              <a:t>cut:  Math for Economics]  </a:t>
-            </a:r>
-            <a:endParaRPr lang="en-US" sz="2000" dirty="0"/>
+              <a:t>Get a great job </a:t>
+            </a:r>
+            <a:endParaRPr lang="en-US" sz="2000" dirty="0" smtClean="0"/>
           </a:p>
           <a:p>
             <a:pPr lvl="1" eaLnBrk="1" hangingPunct="1">
@@ -4553,18 +4652,10 @@
               </a:spcAft>
             </a:pPr>
             <a:r>
-              <a:rPr lang="en-US" sz="2000" dirty="0"/>
-              <a:t>Work with data:  </a:t>
-            </a:r>
-            <a:r>
-              <a:rPr lang="en-US" sz="2000" b="1" dirty="0"/>
-              <a:t>probability</a:t>
-            </a:r>
-            <a:r>
-              <a:rPr lang="en-US" sz="2000" dirty="0"/>
-              <a:t>, stats, data science </a:t>
-            </a:r>
-            <a:endParaRPr lang="en-US" sz="2000" dirty="0" smtClean="0"/>
+              <a:rPr lang="en-US" sz="2000" dirty="0" smtClean="0"/>
+              <a:t>Have fun </a:t>
+            </a:r>
+            <a:endParaRPr lang="en-US" sz="2000" dirty="0"/>
           </a:p>
           <a:p>
             <a:pPr eaLnBrk="1" hangingPunct="1">
@@ -4572,12 +4663,12 @@
                 <a:spcPts val="1200"/>
               </a:spcBef>
               <a:spcAft>
-                <a:spcPts val="0"/>
+                <a:spcPts val="600"/>
               </a:spcAft>
             </a:pPr>
             <a:r>
               <a:rPr lang="en-US" sz="2400" dirty="0" smtClean="0"/>
-              <a:t>Why?</a:t>
+              <a:t>What? </a:t>
             </a:r>
           </a:p>
           <a:p>
@@ -4590,8 +4681,28 @@
               </a:spcAft>
             </a:pPr>
             <a:r>
+              <a:rPr lang="en-US" sz="2000" dirty="0"/>
+              <a:t>Learn to code:  </a:t>
+            </a:r>
+            <a:r>
+              <a:rPr lang="en-US" sz="2000" b="1" dirty="0"/>
+              <a:t>Python</a:t>
+            </a:r>
+            <a:r>
+              <a:rPr lang="en-US" sz="2000" dirty="0"/>
+              <a:t>, </a:t>
+            </a:r>
+            <a:r>
+              <a:rPr lang="en-US" sz="2000" dirty="0" err="1"/>
+              <a:t>Matlab</a:t>
+            </a:r>
+            <a:r>
+              <a:rPr lang="en-US" sz="2000" dirty="0"/>
+              <a:t>, R, </a:t>
+            </a:r>
+            <a:r>
               <a:rPr lang="en-US" sz="2000" dirty="0" smtClean="0"/>
-              <a:t>It’s fun </a:t>
+              <a:t>C++, …    </a:t>
             </a:r>
             <a:endParaRPr lang="en-US" sz="2000" dirty="0"/>
           </a:p>
@@ -4605,13 +4716,22 @@
               </a:spcAft>
             </a:pPr>
             <a:r>
+              <a:rPr lang="en-US" sz="2000" dirty="0"/>
+              <a:t>Join the math gym:  calculus, linear algebra, </a:t>
+            </a:r>
+            <a:r>
               <a:rPr lang="en-US" sz="2000" dirty="0" smtClean="0"/>
-              <a:t>View </a:t>
-            </a:r>
-            <a:r>
-              <a:rPr lang="en-US" sz="2000" dirty="0"/>
-              <a:t>the world in a new way </a:t>
-            </a:r>
+              <a:t>… 		  [short cut:  </a:t>
+            </a:r>
+            <a:r>
+              <a:rPr lang="en-US" sz="2000" b="1" dirty="0" smtClean="0"/>
+              <a:t>Math for Economics</a:t>
+            </a:r>
+            <a:r>
+              <a:rPr lang="en-US" sz="2000" dirty="0" smtClean="0"/>
+              <a:t>]  </a:t>
+            </a:r>
+            <a:endParaRPr lang="en-US" sz="2000" dirty="0"/>
           </a:p>
           <a:p>
             <a:pPr lvl="1" eaLnBrk="1" hangingPunct="1">
@@ -4623,9 +4743,10 @@
               </a:spcAft>
             </a:pPr>
             <a:r>
-              <a:rPr lang="en-US" sz="2000" dirty="0" smtClean="0"/>
-              <a:t>Get a great job </a:t>
-            </a:r>
+              <a:rPr lang="en-US" sz="2000" dirty="0"/>
+              <a:t>Work with data:  probability, stats, data science </a:t>
+            </a:r>
+            <a:endParaRPr lang="en-US" sz="2000" dirty="0" smtClean="0"/>
           </a:p>
         </p:txBody>
       </p:sp>
@@ -4710,13 +4831,8 @@
             <a:pPr algn="l" eaLnBrk="1" hangingPunct="1"/>
             <a:r>
               <a:rPr lang="en-US" dirty="0" smtClean="0"/>
-              <a:t>For </a:t>
-            </a:r>
-            <a:r>
-              <a:rPr lang="en-US" smtClean="0"/>
-              <a:t>more information</a:t>
-            </a:r>
-            <a:endParaRPr lang="en-US" dirty="0" smtClean="0"/>
+              <a:t>For more</a:t>
+            </a:r>
           </a:p>
         </p:txBody>
       </p:sp>
@@ -4730,7 +4846,12 @@
             <p:ph type="body" idx="1"/>
           </p:nvPr>
         </p:nvSpPr>
-        <p:spPr/>
+        <p:spPr>
+          <a:xfrm>
+            <a:off x="457200" y="1577050"/>
+            <a:ext cx="8229600" cy="4525963"/>
+          </a:xfrm>
+        </p:spPr>
         <p:txBody>
           <a:bodyPr/>
           <a:lstStyle/>
@@ -4740,18 +4861,18 @@
                 <a:spcPts val="1200"/>
               </a:spcBef>
               <a:spcAft>
-                <a:spcPts val="0"/>
+                <a:spcPts val="600"/>
               </a:spcAft>
             </a:pPr>
             <a:r>
               <a:rPr lang="en-US" sz="2400" dirty="0" smtClean="0"/>
-              <a:t> Advice page </a:t>
+              <a:t>Read my advice page </a:t>
             </a:r>
           </a:p>
           <a:p>
             <a:pPr lvl="1" eaLnBrk="1" hangingPunct="1">
               <a:spcBef>
-                <a:spcPts val="1200"/>
+                <a:spcPts val="600"/>
               </a:spcBef>
               <a:spcAft>
                 <a:spcPts val="0"/>
@@ -4777,7 +4898,7 @@
           <a:p>
             <a:pPr lvl="1" eaLnBrk="1" hangingPunct="1">
               <a:spcBef>
-                <a:spcPts val="1200"/>
+                <a:spcPts val="600"/>
               </a:spcBef>
               <a:spcAft>
                 <a:spcPts val="0"/>
@@ -4803,7 +4924,7 @@
                 <a:spcPts val="1200"/>
               </a:spcBef>
               <a:spcAft>
-                <a:spcPts val="0"/>
+                <a:spcPts val="600"/>
               </a:spcAft>
             </a:pPr>
             <a:r>
@@ -4814,7 +4935,7 @@
           <a:p>
             <a:pPr lvl="1" eaLnBrk="1" hangingPunct="1">
               <a:spcBef>
-                <a:spcPts val="1200"/>
+                <a:spcPts val="600"/>
               </a:spcBef>
               <a:spcAft>
                 <a:spcPts val="0"/>
@@ -4831,7 +4952,31 @@
           <a:p>
             <a:pPr lvl="1" eaLnBrk="1" hangingPunct="1">
               <a:spcBef>
-                <a:spcPts val="1200"/>
+                <a:spcPts val="600"/>
+              </a:spcBef>
+              <a:spcAft>
+                <a:spcPts val="0"/>
+              </a:spcAft>
+            </a:pPr>
+            <a:r>
+              <a:rPr lang="en-US" sz="2000" dirty="0"/>
+              <a:t>Or email:  </a:t>
+            </a:r>
+            <a:r>
+              <a:rPr lang="en-US" sz="2000" dirty="0">
+                <a:hlinkClick r:id="rId4"/>
+              </a:rPr>
+              <a:t>db3@nyu.edu</a:t>
+            </a:r>
+            <a:r>
+              <a:rPr lang="en-US" sz="2000" dirty="0"/>
+              <a:t> </a:t>
+            </a:r>
+          </a:p>
+          <a:p>
+            <a:pPr lvl="1" eaLnBrk="1" hangingPunct="1">
+              <a:spcBef>
+                <a:spcPts val="600"/>
               </a:spcBef>
               <a:spcAft>
                 <a:spcPts val="0"/>

</xml_diff>